<commit_message>
all_commands: - Abandon the file picker in favour of an all commands workflow. - Update the docs to reflect the new workflow. - Add support for absolute and relative paths. - Add support for spaces in paths by surrounded them by quotes.
</commit_message>
<xml_diff>
--- a/docs/example/example.pptx
+++ b/docs/example/example.pptx
@@ -247,7 +247,7 @@
           <a:p>
             <a:fld id="{4F9D234B-BA72-4F4D-8FEF-1D89CC837754}" type="datetimeFigureOut">
               <a:rPr lang="en-GB" smtClean="0"/>
-              <a:t>20/05/2025</a:t>
+              <a:t>11/08/2025</a:t>
             </a:fld>
             <a:endParaRPr lang="en-GB"/>
           </a:p>
@@ -417,7 +417,7 @@
           <a:p>
             <a:fld id="{4F9D234B-BA72-4F4D-8FEF-1D89CC837754}" type="datetimeFigureOut">
               <a:rPr lang="en-GB" smtClean="0"/>
-              <a:t>20/05/2025</a:t>
+              <a:t>11/08/2025</a:t>
             </a:fld>
             <a:endParaRPr lang="en-GB"/>
           </a:p>
@@ -597,7 +597,7 @@
           <a:p>
             <a:fld id="{4F9D234B-BA72-4F4D-8FEF-1D89CC837754}" type="datetimeFigureOut">
               <a:rPr lang="en-GB" smtClean="0"/>
-              <a:t>20/05/2025</a:t>
+              <a:t>11/08/2025</a:t>
             </a:fld>
             <a:endParaRPr lang="en-GB"/>
           </a:p>
@@ -767,7 +767,7 @@
           <a:p>
             <a:fld id="{4F9D234B-BA72-4F4D-8FEF-1D89CC837754}" type="datetimeFigureOut">
               <a:rPr lang="en-GB" smtClean="0"/>
-              <a:t>20/05/2025</a:t>
+              <a:t>11/08/2025</a:t>
             </a:fld>
             <a:endParaRPr lang="en-GB"/>
           </a:p>
@@ -1013,7 +1013,7 @@
           <a:p>
             <a:fld id="{4F9D234B-BA72-4F4D-8FEF-1D89CC837754}" type="datetimeFigureOut">
               <a:rPr lang="en-GB" smtClean="0"/>
-              <a:t>20/05/2025</a:t>
+              <a:t>11/08/2025</a:t>
             </a:fld>
             <a:endParaRPr lang="en-GB"/>
           </a:p>
@@ -1245,7 +1245,7 @@
           <a:p>
             <a:fld id="{4F9D234B-BA72-4F4D-8FEF-1D89CC837754}" type="datetimeFigureOut">
               <a:rPr lang="en-GB" smtClean="0"/>
-              <a:t>20/05/2025</a:t>
+              <a:t>11/08/2025</a:t>
             </a:fld>
             <a:endParaRPr lang="en-GB"/>
           </a:p>
@@ -1612,7 +1612,7 @@
           <a:p>
             <a:fld id="{4F9D234B-BA72-4F4D-8FEF-1D89CC837754}" type="datetimeFigureOut">
               <a:rPr lang="en-GB" smtClean="0"/>
-              <a:t>20/05/2025</a:t>
+              <a:t>11/08/2025</a:t>
             </a:fld>
             <a:endParaRPr lang="en-GB"/>
           </a:p>
@@ -1730,7 +1730,7 @@
           <a:p>
             <a:fld id="{4F9D234B-BA72-4F4D-8FEF-1D89CC837754}" type="datetimeFigureOut">
               <a:rPr lang="en-GB" smtClean="0"/>
-              <a:t>20/05/2025</a:t>
+              <a:t>11/08/2025</a:t>
             </a:fld>
             <a:endParaRPr lang="en-GB"/>
           </a:p>
@@ -1825,7 +1825,7 @@
           <a:p>
             <a:fld id="{4F9D234B-BA72-4F4D-8FEF-1D89CC837754}" type="datetimeFigureOut">
               <a:rPr lang="en-GB" smtClean="0"/>
-              <a:t>20/05/2025</a:t>
+              <a:t>11/08/2025</a:t>
             </a:fld>
             <a:endParaRPr lang="en-GB"/>
           </a:p>
@@ -2102,7 +2102,7 @@
           <a:p>
             <a:fld id="{4F9D234B-BA72-4F4D-8FEF-1D89CC837754}" type="datetimeFigureOut">
               <a:rPr lang="en-GB" smtClean="0"/>
-              <a:t>20/05/2025</a:t>
+              <a:t>11/08/2025</a:t>
             </a:fld>
             <a:endParaRPr lang="en-GB"/>
           </a:p>
@@ -2359,7 +2359,7 @@
           <a:p>
             <a:fld id="{4F9D234B-BA72-4F4D-8FEF-1D89CC837754}" type="datetimeFigureOut">
               <a:rPr lang="en-GB" smtClean="0"/>
-              <a:t>20/05/2025</a:t>
+              <a:t>11/08/2025</a:t>
             </a:fld>
             <a:endParaRPr lang="en-GB"/>
           </a:p>
@@ -2572,7 +2572,7 @@
           <a:p>
             <a:fld id="{4F9D234B-BA72-4F4D-8FEF-1D89CC837754}" type="datetimeFigureOut">
               <a:rPr lang="en-GB" smtClean="0"/>
-              <a:t>20/05/2025</a:t>
+              <a:t>11/08/2025</a:t>
             </a:fld>
             <a:endParaRPr lang="en-GB"/>
           </a:p>
@@ -3986,36 +3986,36 @@
 <file path=ppt/tags/tag1.xml><?xml version="1.0" encoding="utf-8"?>
 <p:tagLst xmlns:a="http://schemas.openxmlformats.org/drawingml/2006/main" xmlns:r="http://schemas.openxmlformats.org/officeDocument/2006/relationships" xmlns:p="http://schemas.openxmlformats.org/presentationml/2006/main">
   <p:tag name="_I2P_DUMMY_" val="true"/>
-  <p:tag name="_I2P_IMPORT_SETTINGS_" val="-W 1 -c 1 255,255,255"/>
   <p:tag name="_I2P_PATH_RELATIVE_" val="true"/>
   <p:tag name="_I2P_PATH_" val="ai_glass.itd"/>
+  <p:tag name="_I2P_IMPORT_SETTINGS_" val="-W 1 -c 1 255,255,255 ai_glass.itd"/>
 </p:tagLst>
 </file>
 
 <file path=ppt/tags/tag2.xml><?xml version="1.0" encoding="utf-8"?>
 <p:tagLst xmlns:a="http://schemas.openxmlformats.org/drawingml/2006/main" xmlns:r="http://schemas.openxmlformats.org/officeDocument/2006/relationships" xmlns:p="http://schemas.openxmlformats.org/presentationml/2006/main">
   <p:tag name="_I2P_DUMMY_" val="true"/>
-  <p:tag name="_I2P_IMPORT_SETTINGS_" val="-P"/>
   <p:tag name="_I2P_PATH_RELATIVE_" val="true"/>
   <p:tag name="_I2P_PATH_" val="ai_tea.itd"/>
+  <p:tag name="_I2P_IMPORT_SETTINGS_" val="-P ai_tea.itd"/>
 </p:tagLst>
 </file>
 
 <file path=ppt/tags/tag3.xml><?xml version="1.0" encoding="utf-8"?>
 <p:tagLst xmlns:a="http://schemas.openxmlformats.org/drawingml/2006/main" xmlns:r="http://schemas.openxmlformats.org/officeDocument/2006/relationships" xmlns:p="http://schemas.openxmlformats.org/presentationml/2006/main">
-  <p:tag name="_I2P_IMPORT_SETTINGS_" val="-P -W 1"/>
   <p:tag name="_I2P_DUMMY_" val="true"/>
   <p:tag name="_I2P_PATH_RELATIVE_" val="true"/>
   <p:tag name="_I2P_PATH_" val="fltrtest.itd"/>
+  <p:tag name="_I2P_IMPORT_SETTINGS_" val="-P -W 1 fltrtest.itd"/>
 </p:tagLst>
 </file>
 
 <file path=ppt/tags/tag4.xml><?xml version="1.0" encoding="utf-8"?>
 <p:tagLst xmlns:a="http://schemas.openxmlformats.org/drawingml/2006/main" xmlns:r="http://schemas.openxmlformats.org/officeDocument/2006/relationships" xmlns:p="http://schemas.openxmlformats.org/presentationml/2006/main">
   <p:tag name="_I2P_DUMMY_" val="true"/>
-  <p:tag name="_I2P_IMPORT_SETTINGS_" val="-P"/>
   <p:tag name="_I2P_PATH_RELATIVE_" val="true"/>
-  <p:tag name="_I2P_PATH_" val="ai_glass.itd"/>
+  <p:tag name="_I2P_IMPORT_SETTINGS_" val="-P ai_tea.itd"/>
+  <p:tag name="_I2P_PATH_" val="ai_tea.itd"/>
 </p:tagLst>
 </file>
 

</xml_diff>

<commit_message>
- Remove window transparency, take screenshots instead. - Add multi-threaded multi-language logger. - Fix load sequence of the 3D view so that it doesn't look janky.
</commit_message>
<xml_diff>
--- a/docs/example/example.pptx
+++ b/docs/example/example.pptx
@@ -247,7 +247,7 @@
           <a:p>
             <a:fld id="{4F9D234B-BA72-4F4D-8FEF-1D89CC837754}" type="datetimeFigureOut">
               <a:rPr lang="en-GB" smtClean="0"/>
-              <a:t>11/08/2025</a:t>
+              <a:t>03/09/2025</a:t>
             </a:fld>
             <a:endParaRPr lang="en-GB"/>
           </a:p>
@@ -417,7 +417,7 @@
           <a:p>
             <a:fld id="{4F9D234B-BA72-4F4D-8FEF-1D89CC837754}" type="datetimeFigureOut">
               <a:rPr lang="en-GB" smtClean="0"/>
-              <a:t>11/08/2025</a:t>
+              <a:t>03/09/2025</a:t>
             </a:fld>
             <a:endParaRPr lang="en-GB"/>
           </a:p>
@@ -597,7 +597,7 @@
           <a:p>
             <a:fld id="{4F9D234B-BA72-4F4D-8FEF-1D89CC837754}" type="datetimeFigureOut">
               <a:rPr lang="en-GB" smtClean="0"/>
-              <a:t>11/08/2025</a:t>
+              <a:t>03/09/2025</a:t>
             </a:fld>
             <a:endParaRPr lang="en-GB"/>
           </a:p>
@@ -767,7 +767,7 @@
           <a:p>
             <a:fld id="{4F9D234B-BA72-4F4D-8FEF-1D89CC837754}" type="datetimeFigureOut">
               <a:rPr lang="en-GB" smtClean="0"/>
-              <a:t>11/08/2025</a:t>
+              <a:t>03/09/2025</a:t>
             </a:fld>
             <a:endParaRPr lang="en-GB"/>
           </a:p>
@@ -1013,7 +1013,7 @@
           <a:p>
             <a:fld id="{4F9D234B-BA72-4F4D-8FEF-1D89CC837754}" type="datetimeFigureOut">
               <a:rPr lang="en-GB" smtClean="0"/>
-              <a:t>11/08/2025</a:t>
+              <a:t>03/09/2025</a:t>
             </a:fld>
             <a:endParaRPr lang="en-GB"/>
           </a:p>
@@ -1245,7 +1245,7 @@
           <a:p>
             <a:fld id="{4F9D234B-BA72-4F4D-8FEF-1D89CC837754}" type="datetimeFigureOut">
               <a:rPr lang="en-GB" smtClean="0"/>
-              <a:t>11/08/2025</a:t>
+              <a:t>03/09/2025</a:t>
             </a:fld>
             <a:endParaRPr lang="en-GB"/>
           </a:p>
@@ -1612,7 +1612,7 @@
           <a:p>
             <a:fld id="{4F9D234B-BA72-4F4D-8FEF-1D89CC837754}" type="datetimeFigureOut">
               <a:rPr lang="en-GB" smtClean="0"/>
-              <a:t>11/08/2025</a:t>
+              <a:t>03/09/2025</a:t>
             </a:fld>
             <a:endParaRPr lang="en-GB"/>
           </a:p>
@@ -1730,7 +1730,7 @@
           <a:p>
             <a:fld id="{4F9D234B-BA72-4F4D-8FEF-1D89CC837754}" type="datetimeFigureOut">
               <a:rPr lang="en-GB" smtClean="0"/>
-              <a:t>11/08/2025</a:t>
+              <a:t>03/09/2025</a:t>
             </a:fld>
             <a:endParaRPr lang="en-GB"/>
           </a:p>
@@ -1825,7 +1825,7 @@
           <a:p>
             <a:fld id="{4F9D234B-BA72-4F4D-8FEF-1D89CC837754}" type="datetimeFigureOut">
               <a:rPr lang="en-GB" smtClean="0"/>
-              <a:t>11/08/2025</a:t>
+              <a:t>03/09/2025</a:t>
             </a:fld>
             <a:endParaRPr lang="en-GB"/>
           </a:p>
@@ -2102,7 +2102,7 @@
           <a:p>
             <a:fld id="{4F9D234B-BA72-4F4D-8FEF-1D89CC837754}" type="datetimeFigureOut">
               <a:rPr lang="en-GB" smtClean="0"/>
-              <a:t>11/08/2025</a:t>
+              <a:t>03/09/2025</a:t>
             </a:fld>
             <a:endParaRPr lang="en-GB"/>
           </a:p>
@@ -2359,7 +2359,7 @@
           <a:p>
             <a:fld id="{4F9D234B-BA72-4F4D-8FEF-1D89CC837754}" type="datetimeFigureOut">
               <a:rPr lang="en-GB" smtClean="0"/>
-              <a:t>11/08/2025</a:t>
+              <a:t>03/09/2025</a:t>
             </a:fld>
             <a:endParaRPr lang="en-GB"/>
           </a:p>
@@ -2572,7 +2572,7 @@
           <a:p>
             <a:fld id="{4F9D234B-BA72-4F4D-8FEF-1D89CC837754}" type="datetimeFigureOut">
               <a:rPr lang="en-GB" smtClean="0"/>
-              <a:t>11/08/2025</a:t>
+              <a:t>03/09/2025</a:t>
             </a:fld>
             <a:endParaRPr lang="en-GB"/>
           </a:p>

</xml_diff>

<commit_message>
- Add new script based build system. - Make new example presentation.
</commit_message>
<xml_diff>
--- a/docs/example/example.pptx
+++ b/docs/example/example.pptx
@@ -2,10 +2,14 @@
 <file path=ppt/presentation.xml><?xml version="1.0" encoding="utf-8"?>
 <p:presentation xmlns:a="http://schemas.openxmlformats.org/drawingml/2006/main" xmlns:r="http://schemas.openxmlformats.org/officeDocument/2006/relationships" xmlns:p="http://schemas.openxmlformats.org/presentationml/2006/main" saveSubsetFonts="1">
   <p:sldMasterIdLst>
-    <p:sldMasterId id="2147483660" r:id="rId1"/>
+    <p:sldMasterId id="2147483714" r:id="rId1"/>
   </p:sldMasterIdLst>
   <p:sldIdLst>
-    <p:sldId id="260" r:id="rId2"/>
+    <p:sldId id="256" r:id="rId2"/>
+    <p:sldId id="257" r:id="rId3"/>
+    <p:sldId id="258" r:id="rId4"/>
+    <p:sldId id="259" r:id="rId5"/>
+    <p:sldId id="260" r:id="rId6"/>
   </p:sldIdLst>
   <p:sldSz cx="12192000" cy="6858000"/>
   <p:notesSz cx="6858000" cy="9144000"/>
@@ -386,7 +390,7 @@
           <a:p>
             <a:fld id="{2D72B13E-33E1-4518-9566-D50598226E4B}" type="datetimeFigureOut">
               <a:rPr lang="en-IL" smtClean="0"/>
-              <a:t>25/09/2025</a:t>
+              <a:t>26/09/2025</a:t>
             </a:fld>
             <a:endParaRPr lang="en-IL"/>
           </a:p>
@@ -442,7 +446,7 @@
     </p:spTree>
     <p:extLst>
       <p:ext uri="{BB962C8B-B14F-4D97-AF65-F5344CB8AC3E}">
-        <p14:creationId xmlns:p14="http://schemas.microsoft.com/office/powerpoint/2010/main" val="11052517"/>
+        <p14:creationId xmlns:p14="http://schemas.microsoft.com/office/powerpoint/2010/main" val="3393845968"/>
       </p:ext>
     </p:extLst>
   </p:cSld>
@@ -800,7 +804,7 @@
           <a:p>
             <a:fld id="{2D72B13E-33E1-4518-9566-D50598226E4B}" type="datetimeFigureOut">
               <a:rPr lang="en-IL" smtClean="0"/>
-              <a:t>25/09/2025</a:t>
+              <a:t>26/09/2025</a:t>
             </a:fld>
             <a:endParaRPr lang="en-IL"/>
           </a:p>
@@ -856,7 +860,7 @@
     </p:spTree>
     <p:extLst>
       <p:ext uri="{BB962C8B-B14F-4D97-AF65-F5344CB8AC3E}">
-        <p14:creationId xmlns:p14="http://schemas.microsoft.com/office/powerpoint/2010/main" val="532607690"/>
+        <p14:creationId xmlns:p14="http://schemas.microsoft.com/office/powerpoint/2010/main" val="2445290731"/>
       </p:ext>
     </p:extLst>
   </p:cSld>
@@ -1136,7 +1140,7 @@
           <a:p>
             <a:fld id="{2D72B13E-33E1-4518-9566-D50598226E4B}" type="datetimeFigureOut">
               <a:rPr lang="en-IL" smtClean="0"/>
-              <a:t>25/09/2025</a:t>
+              <a:t>26/09/2025</a:t>
             </a:fld>
             <a:endParaRPr lang="en-IL"/>
           </a:p>
@@ -1192,7 +1196,7 @@
     </p:spTree>
     <p:extLst>
       <p:ext uri="{BB962C8B-B14F-4D97-AF65-F5344CB8AC3E}">
-        <p14:creationId xmlns:p14="http://schemas.microsoft.com/office/powerpoint/2010/main" val="868192768"/>
+        <p14:creationId xmlns:p14="http://schemas.microsoft.com/office/powerpoint/2010/main" val="40199452"/>
       </p:ext>
     </p:extLst>
   </p:cSld>
@@ -1541,7 +1545,7 @@
           <a:p>
             <a:fld id="{2D72B13E-33E1-4518-9566-D50598226E4B}" type="datetimeFigureOut">
               <a:rPr lang="en-IL" smtClean="0"/>
-              <a:t>25/09/2025</a:t>
+              <a:t>26/09/2025</a:t>
             </a:fld>
             <a:endParaRPr lang="en-IL"/>
           </a:p>
@@ -1829,7 +1833,7 @@
     </p:spTree>
     <p:extLst>
       <p:ext uri="{BB962C8B-B14F-4D97-AF65-F5344CB8AC3E}">
-        <p14:creationId xmlns:p14="http://schemas.microsoft.com/office/powerpoint/2010/main" val="2494969179"/>
+        <p14:creationId xmlns:p14="http://schemas.microsoft.com/office/powerpoint/2010/main" val="954877649"/>
       </p:ext>
     </p:extLst>
   </p:cSld>
@@ -2109,7 +2113,7 @@
           <a:p>
             <a:fld id="{2D72B13E-33E1-4518-9566-D50598226E4B}" type="datetimeFigureOut">
               <a:rPr lang="en-IL" smtClean="0"/>
-              <a:t>25/09/2025</a:t>
+              <a:t>26/09/2025</a:t>
             </a:fld>
             <a:endParaRPr lang="en-IL"/>
           </a:p>
@@ -2165,7 +2169,7 @@
     </p:spTree>
     <p:extLst>
       <p:ext uri="{BB962C8B-B14F-4D97-AF65-F5344CB8AC3E}">
-        <p14:creationId xmlns:p14="http://schemas.microsoft.com/office/powerpoint/2010/main" val="1085003301"/>
+        <p14:creationId xmlns:p14="http://schemas.microsoft.com/office/powerpoint/2010/main" val="2226937526"/>
       </p:ext>
     </p:extLst>
   </p:cSld>
@@ -2790,7 +2794,7 @@
           <a:p>
             <a:fld id="{2D72B13E-33E1-4518-9566-D50598226E4B}" type="datetimeFigureOut">
               <a:rPr lang="en-IL" smtClean="0"/>
-              <a:t>25/09/2025</a:t>
+              <a:t>26/09/2025</a:t>
             </a:fld>
             <a:endParaRPr lang="en-IL"/>
           </a:p>
@@ -2841,7 +2845,7 @@
     </p:spTree>
     <p:extLst>
       <p:ext uri="{BB962C8B-B14F-4D97-AF65-F5344CB8AC3E}">
-        <p14:creationId xmlns:p14="http://schemas.microsoft.com/office/powerpoint/2010/main" val="145407150"/>
+        <p14:creationId xmlns:p14="http://schemas.microsoft.com/office/powerpoint/2010/main" val="1264658017"/>
       </p:ext>
     </p:extLst>
   </p:cSld>
@@ -3703,7 +3707,7 @@
           <a:p>
             <a:fld id="{2D72B13E-33E1-4518-9566-D50598226E4B}" type="datetimeFigureOut">
               <a:rPr lang="en-IL" smtClean="0"/>
-              <a:t>25/09/2025</a:t>
+              <a:t>26/09/2025</a:t>
             </a:fld>
             <a:endParaRPr lang="en-IL"/>
           </a:p>
@@ -3754,7 +3758,7 @@
     </p:spTree>
     <p:extLst>
       <p:ext uri="{BB962C8B-B14F-4D97-AF65-F5344CB8AC3E}">
-        <p14:creationId xmlns:p14="http://schemas.microsoft.com/office/powerpoint/2010/main" val="1016487334"/>
+        <p14:creationId xmlns:p14="http://schemas.microsoft.com/office/powerpoint/2010/main" val="2775459038"/>
       </p:ext>
     </p:extLst>
   </p:cSld>
@@ -4016,7 +4020,7 @@
           <a:p>
             <a:fld id="{2D72B13E-33E1-4518-9566-D50598226E4B}" type="datetimeFigureOut">
               <a:rPr lang="en-IL" smtClean="0"/>
-              <a:t>25/09/2025</a:t>
+              <a:t>26/09/2025</a:t>
             </a:fld>
             <a:endParaRPr lang="en-IL"/>
           </a:p>
@@ -4067,7 +4071,7 @@
     </p:spTree>
     <p:extLst>
       <p:ext uri="{BB962C8B-B14F-4D97-AF65-F5344CB8AC3E}">
-        <p14:creationId xmlns:p14="http://schemas.microsoft.com/office/powerpoint/2010/main" val="2396971109"/>
+        <p14:creationId xmlns:p14="http://schemas.microsoft.com/office/powerpoint/2010/main" val="3769454079"/>
       </p:ext>
     </p:extLst>
   </p:cSld>
@@ -4280,7 +4284,7 @@
           <a:p>
             <a:fld id="{2D72B13E-33E1-4518-9566-D50598226E4B}" type="datetimeFigureOut">
               <a:rPr lang="en-IL" smtClean="0"/>
-              <a:t>25/09/2025</a:t>
+              <a:t>26/09/2025</a:t>
             </a:fld>
             <a:endParaRPr lang="en-IL"/>
           </a:p>
@@ -4345,7 +4349,7 @@
     </p:spTree>
     <p:extLst>
       <p:ext uri="{BB962C8B-B14F-4D97-AF65-F5344CB8AC3E}">
-        <p14:creationId xmlns:p14="http://schemas.microsoft.com/office/powerpoint/2010/main" val="64829568"/>
+        <p14:creationId xmlns:p14="http://schemas.microsoft.com/office/powerpoint/2010/main" val="271026486"/>
       </p:ext>
     </p:extLst>
   </p:cSld>
@@ -4603,7 +4607,7 @@
           <a:p>
             <a:fld id="{2D72B13E-33E1-4518-9566-D50598226E4B}" type="datetimeFigureOut">
               <a:rPr lang="en-IL" smtClean="0"/>
-              <a:t>25/09/2025</a:t>
+              <a:t>26/09/2025</a:t>
             </a:fld>
             <a:endParaRPr lang="en-IL"/>
           </a:p>
@@ -4654,7 +4658,7 @@
     </p:spTree>
     <p:extLst>
       <p:ext uri="{BB962C8B-B14F-4D97-AF65-F5344CB8AC3E}">
-        <p14:creationId xmlns:p14="http://schemas.microsoft.com/office/powerpoint/2010/main" val="2063956368"/>
+        <p14:creationId xmlns:p14="http://schemas.microsoft.com/office/powerpoint/2010/main" val="1021483053"/>
       </p:ext>
     </p:extLst>
   </p:cSld>
@@ -4992,7 +4996,7 @@
           <a:p>
             <a:fld id="{2D72B13E-33E1-4518-9566-D50598226E4B}" type="datetimeFigureOut">
               <a:rPr lang="en-IL" smtClean="0"/>
-              <a:t>25/09/2025</a:t>
+              <a:t>26/09/2025</a:t>
             </a:fld>
             <a:endParaRPr lang="en-IL"/>
           </a:p>
@@ -5048,7 +5052,7 @@
     </p:spTree>
     <p:extLst>
       <p:ext uri="{BB962C8B-B14F-4D97-AF65-F5344CB8AC3E}">
-        <p14:creationId xmlns:p14="http://schemas.microsoft.com/office/powerpoint/2010/main" val="37385339"/>
+        <p14:creationId xmlns:p14="http://schemas.microsoft.com/office/powerpoint/2010/main" val="3355049890"/>
       </p:ext>
     </p:extLst>
   </p:cSld>
@@ -5368,7 +5372,7 @@
           <a:p>
             <a:fld id="{2D72B13E-33E1-4518-9566-D50598226E4B}" type="datetimeFigureOut">
               <a:rPr lang="en-IL" smtClean="0"/>
-              <a:t>25/09/2025</a:t>
+              <a:t>26/09/2025</a:t>
             </a:fld>
             <a:endParaRPr lang="en-IL"/>
           </a:p>
@@ -5419,7 +5423,7 @@
     </p:spTree>
     <p:extLst>
       <p:ext uri="{BB962C8B-B14F-4D97-AF65-F5344CB8AC3E}">
-        <p14:creationId xmlns:p14="http://schemas.microsoft.com/office/powerpoint/2010/main" val="743490618"/>
+        <p14:creationId xmlns:p14="http://schemas.microsoft.com/office/powerpoint/2010/main" val="1581216709"/>
       </p:ext>
     </p:extLst>
   </p:cSld>
@@ -5874,7 +5878,7 @@
           <a:p>
             <a:fld id="{2D72B13E-33E1-4518-9566-D50598226E4B}" type="datetimeFigureOut">
               <a:rPr lang="en-IL" smtClean="0"/>
-              <a:t>25/09/2025</a:t>
+              <a:t>26/09/2025</a:t>
             </a:fld>
             <a:endParaRPr lang="en-IL"/>
           </a:p>
@@ -5925,7 +5929,7 @@
     </p:spTree>
     <p:extLst>
       <p:ext uri="{BB962C8B-B14F-4D97-AF65-F5344CB8AC3E}">
-        <p14:creationId xmlns:p14="http://schemas.microsoft.com/office/powerpoint/2010/main" val="1913845057"/>
+        <p14:creationId xmlns:p14="http://schemas.microsoft.com/office/powerpoint/2010/main" val="2909273702"/>
       </p:ext>
     </p:extLst>
   </p:cSld>
@@ -6131,7 +6135,7 @@
           <a:p>
             <a:fld id="{2D72B13E-33E1-4518-9566-D50598226E4B}" type="datetimeFigureOut">
               <a:rPr lang="en-IL" smtClean="0"/>
-              <a:t>25/09/2025</a:t>
+              <a:t>26/09/2025</a:t>
             </a:fld>
             <a:endParaRPr lang="en-IL"/>
           </a:p>
@@ -6182,7 +6186,7 @@
     </p:spTree>
     <p:extLst>
       <p:ext uri="{BB962C8B-B14F-4D97-AF65-F5344CB8AC3E}">
-        <p14:creationId xmlns:p14="http://schemas.microsoft.com/office/powerpoint/2010/main" val="2462630412"/>
+        <p14:creationId xmlns:p14="http://schemas.microsoft.com/office/powerpoint/2010/main" val="1385112054"/>
       </p:ext>
     </p:extLst>
   </p:cSld>
@@ -6294,7 +6298,7 @@
           <a:p>
             <a:fld id="{2D72B13E-33E1-4518-9566-D50598226E4B}" type="datetimeFigureOut">
               <a:rPr lang="en-IL" smtClean="0"/>
-              <a:t>25/09/2025</a:t>
+              <a:t>26/09/2025</a:t>
             </a:fld>
             <a:endParaRPr lang="en-IL"/>
           </a:p>
@@ -6345,7 +6349,7 @@
     </p:spTree>
     <p:extLst>
       <p:ext uri="{BB962C8B-B14F-4D97-AF65-F5344CB8AC3E}">
-        <p14:creationId xmlns:p14="http://schemas.microsoft.com/office/powerpoint/2010/main" val="3463192791"/>
+        <p14:creationId xmlns:p14="http://schemas.microsoft.com/office/powerpoint/2010/main" val="2265770744"/>
       </p:ext>
     </p:extLst>
   </p:cSld>
@@ -6684,7 +6688,7 @@
           <a:p>
             <a:fld id="{2D72B13E-33E1-4518-9566-D50598226E4B}" type="datetimeFigureOut">
               <a:rPr lang="en-IL" smtClean="0"/>
-              <a:t>25/09/2025</a:t>
+              <a:t>26/09/2025</a:t>
             </a:fld>
             <a:endParaRPr lang="en-IL"/>
           </a:p>
@@ -6735,7 +6739,7 @@
     </p:spTree>
     <p:extLst>
       <p:ext uri="{BB962C8B-B14F-4D97-AF65-F5344CB8AC3E}">
-        <p14:creationId xmlns:p14="http://schemas.microsoft.com/office/powerpoint/2010/main" val="1398994093"/>
+        <p14:creationId xmlns:p14="http://schemas.microsoft.com/office/powerpoint/2010/main" val="2406560776"/>
       </p:ext>
     </p:extLst>
   </p:cSld>
@@ -7093,7 +7097,7 @@
           <a:p>
             <a:fld id="{2D72B13E-33E1-4518-9566-D50598226E4B}" type="datetimeFigureOut">
               <a:rPr lang="en-IL" smtClean="0"/>
-              <a:t>25/09/2025</a:t>
+              <a:t>26/09/2025</a:t>
             </a:fld>
             <a:endParaRPr lang="en-IL"/>
           </a:p>
@@ -7144,7 +7148,7 @@
     </p:spTree>
     <p:extLst>
       <p:ext uri="{BB962C8B-B14F-4D97-AF65-F5344CB8AC3E}">
-        <p14:creationId xmlns:p14="http://schemas.microsoft.com/office/powerpoint/2010/main" val="501776081"/>
+        <p14:creationId xmlns:p14="http://schemas.microsoft.com/office/powerpoint/2010/main" val="2387765989"/>
       </p:ext>
     </p:extLst>
   </p:cSld>
@@ -7337,7 +7341,7 @@
           <a:p>
             <a:fld id="{2D72B13E-33E1-4518-9566-D50598226E4B}" type="datetimeFigureOut">
               <a:rPr lang="en-IL" smtClean="0"/>
-              <a:t>25/09/2025</a:t>
+              <a:t>26/09/2025</a:t>
             </a:fld>
             <a:endParaRPr lang="en-IL"/>
           </a:p>
@@ -7424,29 +7428,29 @@
     </p:spTree>
     <p:extLst>
       <p:ext uri="{BB962C8B-B14F-4D97-AF65-F5344CB8AC3E}">
-        <p14:creationId xmlns:p14="http://schemas.microsoft.com/office/powerpoint/2010/main" val="616929937"/>
+        <p14:creationId xmlns:p14="http://schemas.microsoft.com/office/powerpoint/2010/main" val="3932892481"/>
       </p:ext>
     </p:extLst>
   </p:cSld>
   <p:clrMap bg1="dk1" tx1="lt1" bg2="dk2" tx2="lt2" accent1="accent1" accent2="accent2" accent3="accent3" accent4="accent4" accent5="accent5" accent6="accent6" hlink="hlink" folHlink="folHlink"/>
   <p:sldLayoutIdLst>
-    <p:sldLayoutId id="2147483661" r:id="rId1"/>
-    <p:sldLayoutId id="2147483662" r:id="rId2"/>
-    <p:sldLayoutId id="2147483663" r:id="rId3"/>
-    <p:sldLayoutId id="2147483664" r:id="rId4"/>
-    <p:sldLayoutId id="2147483665" r:id="rId5"/>
-    <p:sldLayoutId id="2147483666" r:id="rId6"/>
-    <p:sldLayoutId id="2147483667" r:id="rId7"/>
-    <p:sldLayoutId id="2147483668" r:id="rId8"/>
-    <p:sldLayoutId id="2147483669" r:id="rId9"/>
-    <p:sldLayoutId id="2147483670" r:id="rId10"/>
-    <p:sldLayoutId id="2147483671" r:id="rId11"/>
-    <p:sldLayoutId id="2147483672" r:id="rId12"/>
-    <p:sldLayoutId id="2147483673" r:id="rId13"/>
-    <p:sldLayoutId id="2147483674" r:id="rId14"/>
-    <p:sldLayoutId id="2147483675" r:id="rId15"/>
-    <p:sldLayoutId id="2147483676" r:id="rId16"/>
-    <p:sldLayoutId id="2147483677" r:id="rId17"/>
+    <p:sldLayoutId id="2147483715" r:id="rId1"/>
+    <p:sldLayoutId id="2147483716" r:id="rId2"/>
+    <p:sldLayoutId id="2147483717" r:id="rId3"/>
+    <p:sldLayoutId id="2147483718" r:id="rId4"/>
+    <p:sldLayoutId id="2147483719" r:id="rId5"/>
+    <p:sldLayoutId id="2147483720" r:id="rId6"/>
+    <p:sldLayoutId id="2147483721" r:id="rId7"/>
+    <p:sldLayoutId id="2147483722" r:id="rId8"/>
+    <p:sldLayoutId id="2147483723" r:id="rId9"/>
+    <p:sldLayoutId id="2147483724" r:id="rId10"/>
+    <p:sldLayoutId id="2147483725" r:id="rId11"/>
+    <p:sldLayoutId id="2147483726" r:id="rId12"/>
+    <p:sldLayoutId id="2147483727" r:id="rId13"/>
+    <p:sldLayoutId id="2147483728" r:id="rId14"/>
+    <p:sldLayoutId id="2147483729" r:id="rId15"/>
+    <p:sldLayoutId id="2147483730" r:id="rId16"/>
+    <p:sldLayoutId id="2147483731" r:id="rId17"/>
   </p:sldLayoutIdLst>
   <p:txStyles>
     <p:titleStyle>
@@ -7753,7 +7757,7 @@
           <p:cNvPr id="2" name="Title 1">
             <a:extLst>
               <a:ext uri="{FF2B5EF4-FFF2-40B4-BE49-F238E27FC236}">
-                <a16:creationId xmlns:a16="http://schemas.microsoft.com/office/drawing/2014/main" id="{12A548E3-CEE8-EA32-235C-A3040AF8226C}"/>
+                <a16:creationId xmlns:a16="http://schemas.microsoft.com/office/drawing/2014/main" id="{CE0D2DD5-C8A1-7973-43D0-755351718BE9}"/>
               </a:ext>
             </a:extLst>
           </p:cNvPr>
@@ -7761,7 +7765,7 @@
             <a:spLocks noGrp="1"/>
           </p:cNvSpPr>
           <p:nvPr>
-            <p:ph type="title"/>
+            <p:ph type="ctrTitle"/>
           </p:nvPr>
         </p:nvSpPr>
         <p:spPr/>
@@ -7769,7 +7773,70 @@
           <a:bodyPr/>
           <a:lstStyle/>
           <a:p>
-            <a:endParaRPr lang="en-IL"/>
+            <a:r>
+              <a:rPr lang="en-GB" dirty="0"/>
+              <a:t>Irit2Powerpoint Demo</a:t>
+            </a:r>
+            <a:endParaRPr lang="en-IL" dirty="0"/>
+          </a:p>
+        </p:txBody>
+      </p:sp>
+    </p:spTree>
+    <p:extLst>
+      <p:ext uri="{BB962C8B-B14F-4D97-AF65-F5344CB8AC3E}">
+        <p14:creationId xmlns:p14="http://schemas.microsoft.com/office/powerpoint/2010/main" val="3342513194"/>
+      </p:ext>
+    </p:extLst>
+  </p:cSld>
+  <p:clrMapOvr>
+    <a:masterClrMapping/>
+  </p:clrMapOvr>
+</p:sld>
+</file>
+
+<file path=ppt/slides/slide2.xml><?xml version="1.0" encoding="utf-8"?>
+<p:sld xmlns:a="http://schemas.openxmlformats.org/drawingml/2006/main" xmlns:r="http://schemas.openxmlformats.org/officeDocument/2006/relationships" xmlns:p="http://schemas.openxmlformats.org/presentationml/2006/main">
+  <p:cSld>
+    <p:spTree>
+      <p:nvGrpSpPr>
+        <p:cNvPr id="1" name=""/>
+        <p:cNvGrpSpPr/>
+        <p:nvPr/>
+      </p:nvGrpSpPr>
+      <p:grpSpPr>
+        <a:xfrm>
+          <a:off x="0" y="0"/>
+          <a:ext cx="0" cy="0"/>
+          <a:chOff x="0" y="0"/>
+          <a:chExt cx="0" cy="0"/>
+        </a:xfrm>
+      </p:grpSpPr>
+      <p:sp>
+        <p:nvSpPr>
+          <p:cNvPr id="2" name="Title 1">
+            <a:extLst>
+              <a:ext uri="{FF2B5EF4-FFF2-40B4-BE49-F238E27FC236}">
+                <a16:creationId xmlns:a16="http://schemas.microsoft.com/office/drawing/2014/main" id="{AD701658-7F2E-D254-AAEB-6097DD40BF98}"/>
+              </a:ext>
+            </a:extLst>
+          </p:cNvPr>
+          <p:cNvSpPr>
+            <a:spLocks noGrp="1"/>
+          </p:cNvSpPr>
+          <p:nvPr>
+            <p:ph type="title"/>
+          </p:nvPr>
+        </p:nvSpPr>
+        <p:spPr/>
+        <p:txBody>
+          <a:bodyPr/>
+          <a:lstStyle/>
+          <a:p>
+            <a:r>
+              <a:rPr lang="en-GB" dirty="0"/>
+              <a:t>Usage</a:t>
+            </a:r>
+            <a:endParaRPr lang="en-IL" dirty="0"/>
           </a:p>
         </p:txBody>
       </p:sp>
@@ -7778,7 +7845,7 @@
           <p:cNvPr id="3" name="Content Placeholder 2">
             <a:extLst>
               <a:ext uri="{FF2B5EF4-FFF2-40B4-BE49-F238E27FC236}">
-                <a16:creationId xmlns:a16="http://schemas.microsoft.com/office/drawing/2014/main" id="{908A4BC2-2509-4AE7-52B0-301266AC7CA8}"/>
+                <a16:creationId xmlns:a16="http://schemas.microsoft.com/office/drawing/2014/main" id="{C5DA820B-40F4-962F-2277-504E4948FB50}"/>
               </a:ext>
             </a:extLst>
           </p:cNvPr>
@@ -7794,16 +7861,169 @@
           <a:bodyPr/>
           <a:lstStyle/>
           <a:p>
-            <a:endParaRPr lang="en-IL"/>
-          </a:p>
-        </p:txBody>
-      </p:sp>
-      <p:sp>
-        <p:nvSpPr>
-          <p:cNvPr id="5" name="__IRIT2POWERPOINT_CONTAINER__">
+            <a:r>
+              <a:rPr lang="en-GB" dirty="0">
+                <a:solidFill>
+                  <a:schemeClr val="bg1"/>
+                </a:solidFill>
+              </a:rPr>
+              <a:t>Click on the Irit to </a:t>
+            </a:r>
+            <a:r>
+              <a:rPr lang="en-GB" dirty="0" err="1">
+                <a:solidFill>
+                  <a:schemeClr val="bg1"/>
+                </a:solidFill>
+              </a:rPr>
+              <a:t>Powerpoint</a:t>
+            </a:r>
+            <a:r>
+              <a:rPr lang="en-GB" dirty="0">
+                <a:solidFill>
+                  <a:schemeClr val="bg1"/>
+                </a:solidFill>
+              </a:rPr>
+              <a:t> button and provide the command line arguments.</a:t>
+            </a:r>
+          </a:p>
+          <a:p>
+            <a:r>
+              <a:rPr lang="en-GB" dirty="0">
+                <a:solidFill>
+                  <a:schemeClr val="bg1"/>
+                </a:solidFill>
+              </a:rPr>
+              <a:t>All files supported by the </a:t>
+            </a:r>
+            <a:r>
+              <a:rPr lang="en-GB" dirty="0" err="1">
+                <a:solidFill>
+                  <a:schemeClr val="bg1"/>
+                </a:solidFill>
+              </a:rPr>
+              <a:t>irit</a:t>
+            </a:r>
+            <a:r>
+              <a:rPr lang="en-GB" dirty="0">
+                <a:solidFill>
+                  <a:schemeClr val="bg1"/>
+                </a:solidFill>
+              </a:rPr>
+              <a:t> file</a:t>
+            </a:r>
+            <a:br>
+              <a:rPr lang="en-GB" dirty="0">
+                <a:solidFill>
+                  <a:schemeClr val="bg1"/>
+                </a:solidFill>
+              </a:rPr>
+            </a:br>
+            <a:r>
+              <a:rPr lang="en-GB" dirty="0">
+                <a:solidFill>
+                  <a:schemeClr val="bg1"/>
+                </a:solidFill>
+              </a:rPr>
+              <a:t>parser are also supported by I2P</a:t>
+            </a:r>
+            <a:br>
+              <a:rPr lang="en-GB" dirty="0">
+                <a:solidFill>
+                  <a:schemeClr val="bg1"/>
+                </a:solidFill>
+              </a:rPr>
+            </a:br>
+            <a:r>
+              <a:rPr lang="en-GB" dirty="0">
+                <a:solidFill>
+                  <a:schemeClr val="bg1"/>
+                </a:solidFill>
+              </a:rPr>
+              <a:t>this includes:</a:t>
+            </a:r>
+          </a:p>
+          <a:p>
+            <a:pPr lvl="1"/>
+            <a:r>
+              <a:rPr lang="en-GB" dirty="0">
+                <a:solidFill>
+                  <a:schemeClr val="bg1"/>
+                </a:solidFill>
+              </a:rPr>
+              <a:t>ITD</a:t>
+            </a:r>
+          </a:p>
+          <a:p>
+            <a:pPr lvl="1"/>
+            <a:r>
+              <a:rPr lang="en-GB" dirty="0">
+                <a:solidFill>
+                  <a:schemeClr val="bg1"/>
+                </a:solidFill>
+              </a:rPr>
+              <a:t>OBJ</a:t>
+            </a:r>
+          </a:p>
+          <a:p>
+            <a:pPr lvl="1"/>
+            <a:r>
+              <a:rPr lang="en-GB" dirty="0">
+                <a:solidFill>
+                  <a:schemeClr val="bg1"/>
+                </a:solidFill>
+              </a:rPr>
+              <a:t>STL</a:t>
+            </a:r>
+          </a:p>
+          <a:p>
+            <a:pPr lvl="1"/>
+            <a:r>
+              <a:rPr lang="en-GB" dirty="0">
+                <a:solidFill>
+                  <a:schemeClr val="bg1"/>
+                </a:solidFill>
+              </a:rPr>
+              <a:t>And many others</a:t>
+            </a:r>
+          </a:p>
+        </p:txBody>
+      </p:sp>
+      <p:pic>
+        <p:nvPicPr>
+          <p:cNvPr id="5" name="Picture 4">
             <a:extLst>
               <a:ext uri="{FF2B5EF4-FFF2-40B4-BE49-F238E27FC236}">
-                <a16:creationId xmlns:a16="http://schemas.microsoft.com/office/drawing/2014/main" id="{2BE208CB-9E9E-BBC5-8B5B-2839B95DF098}"/>
+                <a16:creationId xmlns:a16="http://schemas.microsoft.com/office/drawing/2014/main" id="{7F1AAF1B-7CD7-8315-17A5-80791435E402}"/>
+              </a:ext>
+            </a:extLst>
+          </p:cNvPr>
+          <p:cNvPicPr>
+            <a:picLocks noChangeAspect="1"/>
+          </p:cNvPicPr>
+          <p:nvPr/>
+        </p:nvPicPr>
+        <p:blipFill>
+          <a:blip r:embed="rId3"/>
+          <a:stretch>
+            <a:fillRect/>
+          </a:stretch>
+        </p:blipFill>
+        <p:spPr>
+          <a:xfrm>
+            <a:off x="5778376" y="2738642"/>
+            <a:ext cx="863644" cy="901746"/>
+          </a:xfrm>
+          <a:prstGeom prst="rect">
+            <a:avLst/>
+          </a:prstGeom>
+        </p:spPr>
+      </p:pic>
+      <p:sp>
+        <p:nvSpPr>
+          <p:cNvPr id="6" name="__IRIT2POWERPOINT_CONTAINER__">
+            <a:extLst>
+              <a:ext uri="{FF2B5EF4-FFF2-40B4-BE49-F238E27FC236}">
+                <a16:creationId xmlns:a16="http://schemas.microsoft.com/office/drawing/2014/main" id="{10855F13-43CC-35DB-4BC1-B7474AFBDB3E}"/>
               </a:ext>
             </a:extLst>
           </p:cNvPr>
@@ -7812,7 +8032,7 @@
         </p:nvSpPr>
         <p:spPr>
           <a:xfrm>
-            <a:off x="2947251" y="1235606"/>
+            <a:off x="5778376" y="2891041"/>
             <a:ext cx="5080000" cy="3810000"/>
           </a:xfrm>
           <a:prstGeom prst="roundRect">
@@ -7867,7 +8087,536 @@
     </p:custDataLst>
     <p:extLst>
       <p:ext uri="{BB962C8B-B14F-4D97-AF65-F5344CB8AC3E}">
-        <p14:creationId xmlns:p14="http://schemas.microsoft.com/office/powerpoint/2010/main" val="1287090140"/>
+        <p14:creationId xmlns:p14="http://schemas.microsoft.com/office/powerpoint/2010/main" val="243350821"/>
+      </p:ext>
+    </p:extLst>
+  </p:cSld>
+  <p:clrMapOvr>
+    <a:masterClrMapping/>
+  </p:clrMapOvr>
+</p:sld>
+</file>
+
+<file path=ppt/slides/slide3.xml><?xml version="1.0" encoding="utf-8"?>
+<p:sld xmlns:a="http://schemas.openxmlformats.org/drawingml/2006/main" xmlns:r="http://schemas.openxmlformats.org/officeDocument/2006/relationships" xmlns:p="http://schemas.openxmlformats.org/presentationml/2006/main">
+  <p:cSld>
+    <p:spTree>
+      <p:nvGrpSpPr>
+        <p:cNvPr id="1" name=""/>
+        <p:cNvGrpSpPr/>
+        <p:nvPr/>
+      </p:nvGrpSpPr>
+      <p:grpSpPr>
+        <a:xfrm>
+          <a:off x="0" y="0"/>
+          <a:ext cx="0" cy="0"/>
+          <a:chOff x="0" y="0"/>
+          <a:chExt cx="0" cy="0"/>
+        </a:xfrm>
+      </p:grpSpPr>
+      <p:sp>
+        <p:nvSpPr>
+          <p:cNvPr id="2" name="Title 1">
+            <a:extLst>
+              <a:ext uri="{FF2B5EF4-FFF2-40B4-BE49-F238E27FC236}">
+                <a16:creationId xmlns:a16="http://schemas.microsoft.com/office/drawing/2014/main" id="{0430AE7F-F95F-664C-2DCA-CCFA2FFD9E69}"/>
+              </a:ext>
+            </a:extLst>
+          </p:cNvPr>
+          <p:cNvSpPr>
+            <a:spLocks noGrp="1"/>
+          </p:cNvSpPr>
+          <p:nvPr>
+            <p:ph type="title"/>
+          </p:nvPr>
+        </p:nvSpPr>
+        <p:spPr/>
+        <p:txBody>
+          <a:bodyPr/>
+          <a:lstStyle/>
+          <a:p>
+            <a:r>
+              <a:rPr lang="en-GB" dirty="0"/>
+              <a:t>Features</a:t>
+            </a:r>
+            <a:endParaRPr lang="en-IL" dirty="0"/>
+          </a:p>
+        </p:txBody>
+      </p:sp>
+      <p:sp>
+        <p:nvSpPr>
+          <p:cNvPr id="3" name="Content Placeholder 2">
+            <a:extLst>
+              <a:ext uri="{FF2B5EF4-FFF2-40B4-BE49-F238E27FC236}">
+                <a16:creationId xmlns:a16="http://schemas.microsoft.com/office/drawing/2014/main" id="{459CD76A-2E02-9458-611F-F9DE8DECF1D7}"/>
+              </a:ext>
+            </a:extLst>
+          </p:cNvPr>
+          <p:cNvSpPr>
+            <a:spLocks noGrp="1"/>
+          </p:cNvSpPr>
+          <p:nvPr>
+            <p:ph idx="1"/>
+          </p:nvPr>
+        </p:nvSpPr>
+        <p:spPr/>
+        <p:txBody>
+          <a:bodyPr/>
+          <a:lstStyle/>
+          <a:p>
+            <a:r>
+              <a:rPr lang="en-GB" dirty="0">
+                <a:solidFill>
+                  <a:schemeClr val="bg1"/>
+                </a:solidFill>
+              </a:rPr>
+              <a:t>Real time rendering of 3D models within presentation using OpenGL.</a:t>
+            </a:r>
+          </a:p>
+          <a:p>
+            <a:r>
+              <a:rPr lang="en-GB" dirty="0">
+                <a:solidFill>
+                  <a:schemeClr val="bg1"/>
+                </a:solidFill>
+              </a:rPr>
+              <a:t>Support for all Irit primitives for rendering.</a:t>
+            </a:r>
+          </a:p>
+          <a:p>
+            <a:r>
+              <a:rPr lang="en-GB" dirty="0">
+                <a:solidFill>
+                  <a:schemeClr val="bg1"/>
+                </a:solidFill>
+              </a:rPr>
+              <a:t>Slide aware compositing and anti-aliasing.</a:t>
+            </a:r>
+          </a:p>
+          <a:p>
+            <a:r>
+              <a:rPr lang="en-GB" dirty="0">
+                <a:solidFill>
+                  <a:schemeClr val="bg1"/>
+                </a:solidFill>
+              </a:rPr>
+              <a:t>Scenes are fully described by ITD files, further command line arguments can be provided (See the docs directory)</a:t>
+            </a:r>
+          </a:p>
+          <a:p>
+            <a:r>
+              <a:rPr lang="en-GB" dirty="0">
+                <a:solidFill>
+                  <a:schemeClr val="bg1"/>
+                </a:solidFill>
+              </a:rPr>
+              <a:t>Multi-threaded resource manager for loading and parsing the provided files</a:t>
+            </a:r>
+          </a:p>
+        </p:txBody>
+      </p:sp>
+      <p:sp>
+        <p:nvSpPr>
+          <p:cNvPr id="4" name="__IRIT2POWERPOINT_CONTAINER__">
+            <a:extLst>
+              <a:ext uri="{FF2B5EF4-FFF2-40B4-BE49-F238E27FC236}">
+                <a16:creationId xmlns:a16="http://schemas.microsoft.com/office/drawing/2014/main" id="{00D67623-D1C2-B0FC-D0E6-058D1C68847A}"/>
+              </a:ext>
+            </a:extLst>
+          </p:cNvPr>
+          <p:cNvSpPr/>
+          <p:nvPr/>
+        </p:nvSpPr>
+        <p:spPr>
+          <a:xfrm>
+            <a:off x="5921828" y="2336873"/>
+            <a:ext cx="5080000" cy="3810000"/>
+          </a:xfrm>
+          <a:prstGeom prst="roundRect">
+            <a:avLst/>
+          </a:prstGeom>
+          <a:noFill/>
+          <a:ln w="12700" cap="flat" cmpd="sng" algn="ctr">
+            <a:solidFill>
+              <a:srgbClr val="000000"/>
+            </a:solidFill>
+            <a:prstDash val="solid"/>
+          </a:ln>
+          <a:effectLst/>
+          <a:extLst>
+            <a:ext uri="{909E8E84-426E-40DD-AFC4-6F175D3DCCD1}">
+              <a14:hiddenFill xmlns:a14="http://schemas.microsoft.com/office/drawing/2010/main">
+                <a:solidFill>
+                  <a:schemeClr val="accent1"/>
+                </a:solidFill>
+              </a14:hiddenFill>
+            </a:ext>
+          </a:extLst>
+        </p:spPr>
+        <p:style>
+          <a:lnRef idx="2">
+            <a:schemeClr val="accent1">
+              <a:shade val="15000"/>
+            </a:schemeClr>
+          </a:lnRef>
+          <a:fillRef idx="1">
+            <a:schemeClr val="accent1"/>
+          </a:fillRef>
+          <a:effectRef idx="0">
+            <a:schemeClr val="accent1"/>
+          </a:effectRef>
+          <a:fontRef idx="minor">
+            <a:schemeClr val="lt1"/>
+          </a:fontRef>
+        </p:style>
+        <p:txBody>
+          <a:bodyPr rtlCol="0" anchor="ctr"/>
+          <a:lstStyle/>
+          <a:p>
+            <a:pPr algn="ctr"/>
+            <a:endParaRPr lang="en-IL"/>
+          </a:p>
+        </p:txBody>
+      </p:sp>
+    </p:spTree>
+    <p:custDataLst>
+      <p:tags r:id="rId1"/>
+    </p:custDataLst>
+    <p:extLst>
+      <p:ext uri="{BB962C8B-B14F-4D97-AF65-F5344CB8AC3E}">
+        <p14:creationId xmlns:p14="http://schemas.microsoft.com/office/powerpoint/2010/main" val="3901728896"/>
+      </p:ext>
+    </p:extLst>
+  </p:cSld>
+  <p:clrMapOvr>
+    <a:masterClrMapping/>
+  </p:clrMapOvr>
+</p:sld>
+</file>
+
+<file path=ppt/slides/slide4.xml><?xml version="1.0" encoding="utf-8"?>
+<p:sld xmlns:a="http://schemas.openxmlformats.org/drawingml/2006/main" xmlns:r="http://schemas.openxmlformats.org/officeDocument/2006/relationships" xmlns:p="http://schemas.openxmlformats.org/presentationml/2006/main">
+  <p:cSld>
+    <p:spTree>
+      <p:nvGrpSpPr>
+        <p:cNvPr id="1" name=""/>
+        <p:cNvGrpSpPr/>
+        <p:nvPr/>
+      </p:nvGrpSpPr>
+      <p:grpSpPr>
+        <a:xfrm>
+          <a:off x="0" y="0"/>
+          <a:ext cx="0" cy="0"/>
+          <a:chOff x="0" y="0"/>
+          <a:chExt cx="0" cy="0"/>
+        </a:xfrm>
+      </p:grpSpPr>
+      <p:sp>
+        <p:nvSpPr>
+          <p:cNvPr id="2" name="Title 1">
+            <a:extLst>
+              <a:ext uri="{FF2B5EF4-FFF2-40B4-BE49-F238E27FC236}">
+                <a16:creationId xmlns:a16="http://schemas.microsoft.com/office/drawing/2014/main" id="{5FA5B8DE-C1DF-E5D4-2A30-A6646AFE7D5A}"/>
+              </a:ext>
+            </a:extLst>
+          </p:cNvPr>
+          <p:cNvSpPr>
+            <a:spLocks noGrp="1"/>
+          </p:cNvSpPr>
+          <p:nvPr>
+            <p:ph type="title"/>
+          </p:nvPr>
+        </p:nvSpPr>
+        <p:spPr/>
+        <p:txBody>
+          <a:bodyPr/>
+          <a:lstStyle/>
+          <a:p>
+            <a:r>
+              <a:rPr lang="en-GB" dirty="0"/>
+              <a:t>Constraints</a:t>
+            </a:r>
+            <a:endParaRPr lang="en-IL" dirty="0"/>
+          </a:p>
+        </p:txBody>
+      </p:sp>
+      <p:sp>
+        <p:nvSpPr>
+          <p:cNvPr id="3" name="Content Placeholder 2">
+            <a:extLst>
+              <a:ext uri="{FF2B5EF4-FFF2-40B4-BE49-F238E27FC236}">
+                <a16:creationId xmlns:a16="http://schemas.microsoft.com/office/drawing/2014/main" id="{1FD7DE41-F992-95D3-1983-6550D2858FF7}"/>
+              </a:ext>
+            </a:extLst>
+          </p:cNvPr>
+          <p:cNvSpPr>
+            <a:spLocks noGrp="1"/>
+          </p:cNvSpPr>
+          <p:nvPr>
+            <p:ph idx="1"/>
+          </p:nvPr>
+        </p:nvSpPr>
+        <p:spPr/>
+        <p:txBody>
+          <a:bodyPr/>
+          <a:lstStyle/>
+          <a:p>
+            <a:r>
+              <a:rPr lang="en-GB" dirty="0">
+                <a:solidFill>
+                  <a:schemeClr val="bg1"/>
+                </a:solidFill>
+              </a:rPr>
+              <a:t>Only one I2P window per slide</a:t>
+            </a:r>
+          </a:p>
+          <a:p>
+            <a:r>
+              <a:rPr lang="en-GB" dirty="0">
+                <a:solidFill>
+                  <a:schemeClr val="bg1"/>
+                </a:solidFill>
+              </a:rPr>
+              <a:t>The 3D files live separately from the presentation file</a:t>
+            </a:r>
+          </a:p>
+          <a:p>
+            <a:r>
+              <a:rPr lang="en-GB" dirty="0">
+                <a:solidFill>
+                  <a:schemeClr val="bg1"/>
+                </a:solidFill>
+              </a:rPr>
+              <a:t>Only one ITD file can be provided per slide</a:t>
+            </a:r>
+          </a:p>
+          <a:p>
+            <a:r>
+              <a:rPr lang="en-GB" dirty="0">
+                <a:solidFill>
+                  <a:schemeClr val="bg1"/>
+                </a:solidFill>
+              </a:rPr>
+              <a:t>No support for textures and UV mapping</a:t>
+            </a:r>
+          </a:p>
+          <a:p>
+            <a:pPr marL="0" indent="0">
+              <a:buNone/>
+            </a:pPr>
+            <a:endParaRPr lang="en-GB" dirty="0">
+              <a:solidFill>
+                <a:schemeClr val="bg1"/>
+              </a:solidFill>
+            </a:endParaRPr>
+          </a:p>
+          <a:p>
+            <a:pPr marL="0" indent="0">
+              <a:buNone/>
+            </a:pPr>
+            <a:endParaRPr lang="en-IL" dirty="0">
+              <a:solidFill>
+                <a:schemeClr val="bg1"/>
+              </a:solidFill>
+            </a:endParaRPr>
+          </a:p>
+        </p:txBody>
+      </p:sp>
+      <p:sp>
+        <p:nvSpPr>
+          <p:cNvPr id="4" name="__IRIT2POWERPOINT_CONTAINER__">
+            <a:extLst>
+              <a:ext uri="{FF2B5EF4-FFF2-40B4-BE49-F238E27FC236}">
+                <a16:creationId xmlns:a16="http://schemas.microsoft.com/office/drawing/2014/main" id="{EF6859DD-05CC-D913-9DFF-01EB0C99970C}"/>
+              </a:ext>
+            </a:extLst>
+          </p:cNvPr>
+          <p:cNvSpPr/>
+          <p:nvPr/>
+        </p:nvSpPr>
+        <p:spPr>
+          <a:xfrm>
+            <a:off x="3450771" y="4201886"/>
+            <a:ext cx="5080000" cy="2514600"/>
+          </a:xfrm>
+          <a:prstGeom prst="roundRect">
+            <a:avLst/>
+          </a:prstGeom>
+          <a:noFill/>
+          <a:ln w="12700" cap="flat" cmpd="sng" algn="ctr">
+            <a:solidFill>
+              <a:srgbClr val="000000"/>
+            </a:solidFill>
+            <a:prstDash val="solid"/>
+          </a:ln>
+          <a:effectLst/>
+          <a:extLst>
+            <a:ext uri="{909E8E84-426E-40DD-AFC4-6F175D3DCCD1}">
+              <a14:hiddenFill xmlns:a14="http://schemas.microsoft.com/office/drawing/2010/main">
+                <a:solidFill>
+                  <a:schemeClr val="accent1"/>
+                </a:solidFill>
+              </a14:hiddenFill>
+            </a:ext>
+          </a:extLst>
+        </p:spPr>
+        <p:style>
+          <a:lnRef idx="2">
+            <a:schemeClr val="accent1">
+              <a:shade val="15000"/>
+            </a:schemeClr>
+          </a:lnRef>
+          <a:fillRef idx="1">
+            <a:schemeClr val="accent1"/>
+          </a:fillRef>
+          <a:effectRef idx="0">
+            <a:schemeClr val="accent1"/>
+          </a:effectRef>
+          <a:fontRef idx="minor">
+            <a:schemeClr val="lt1"/>
+          </a:fontRef>
+        </p:style>
+        <p:txBody>
+          <a:bodyPr rtlCol="0" anchor="ctr"/>
+          <a:lstStyle/>
+          <a:p>
+            <a:pPr algn="ctr"/>
+            <a:endParaRPr lang="en-IL"/>
+          </a:p>
+        </p:txBody>
+      </p:sp>
+    </p:spTree>
+    <p:custDataLst>
+      <p:tags r:id="rId1"/>
+    </p:custDataLst>
+    <p:extLst>
+      <p:ext uri="{BB962C8B-B14F-4D97-AF65-F5344CB8AC3E}">
+        <p14:creationId xmlns:p14="http://schemas.microsoft.com/office/powerpoint/2010/main" val="1916784171"/>
+      </p:ext>
+    </p:extLst>
+  </p:cSld>
+  <p:clrMapOvr>
+    <a:masterClrMapping/>
+  </p:clrMapOvr>
+</p:sld>
+</file>
+
+<file path=ppt/slides/slide5.xml><?xml version="1.0" encoding="utf-8"?>
+<p:sld xmlns:a="http://schemas.openxmlformats.org/drawingml/2006/main" xmlns:r="http://schemas.openxmlformats.org/officeDocument/2006/relationships" xmlns:p="http://schemas.openxmlformats.org/presentationml/2006/main">
+  <p:cSld>
+    <p:spTree>
+      <p:nvGrpSpPr>
+        <p:cNvPr id="1" name=""/>
+        <p:cNvGrpSpPr/>
+        <p:nvPr/>
+      </p:nvGrpSpPr>
+      <p:grpSpPr>
+        <a:xfrm>
+          <a:off x="0" y="0"/>
+          <a:ext cx="0" cy="0"/>
+          <a:chOff x="0" y="0"/>
+          <a:chExt cx="0" cy="0"/>
+        </a:xfrm>
+      </p:grpSpPr>
+      <p:sp>
+        <p:nvSpPr>
+          <p:cNvPr id="2" name="Title 1">
+            <a:extLst>
+              <a:ext uri="{FF2B5EF4-FFF2-40B4-BE49-F238E27FC236}">
+                <a16:creationId xmlns:a16="http://schemas.microsoft.com/office/drawing/2014/main" id="{60351C9C-DF22-F6D9-6450-36EDEC917850}"/>
+              </a:ext>
+            </a:extLst>
+          </p:cNvPr>
+          <p:cNvSpPr>
+            <a:spLocks noGrp="1"/>
+          </p:cNvSpPr>
+          <p:nvPr>
+            <p:ph type="title"/>
+          </p:nvPr>
+        </p:nvSpPr>
+        <p:spPr/>
+        <p:txBody>
+          <a:bodyPr/>
+          <a:lstStyle/>
+          <a:p>
+            <a:r>
+              <a:rPr lang="en-GB" dirty="0"/>
+              <a:t>Thank you!</a:t>
+            </a:r>
+            <a:endParaRPr lang="en-IL" dirty="0"/>
+          </a:p>
+        </p:txBody>
+      </p:sp>
+      <p:sp>
+        <p:nvSpPr>
+          <p:cNvPr id="4" name="__IRIT2POWERPOINT_CONTAINER__">
+            <a:extLst>
+              <a:ext uri="{FF2B5EF4-FFF2-40B4-BE49-F238E27FC236}">
+                <a16:creationId xmlns:a16="http://schemas.microsoft.com/office/drawing/2014/main" id="{B578C64C-4558-DBAF-89C8-79A91171E6BB}"/>
+              </a:ext>
+            </a:extLst>
+          </p:cNvPr>
+          <p:cNvSpPr/>
+          <p:nvPr/>
+        </p:nvSpPr>
+        <p:spPr>
+          <a:xfrm>
+            <a:off x="3556000" y="2403629"/>
+            <a:ext cx="5080000" cy="3810000"/>
+          </a:xfrm>
+          <a:prstGeom prst="roundRect">
+            <a:avLst/>
+          </a:prstGeom>
+          <a:noFill/>
+          <a:ln w="12700" cap="flat" cmpd="sng" algn="ctr">
+            <a:solidFill>
+              <a:srgbClr val="000000"/>
+            </a:solidFill>
+            <a:prstDash val="solid"/>
+          </a:ln>
+          <a:effectLst/>
+          <a:extLst>
+            <a:ext uri="{909E8E84-426E-40DD-AFC4-6F175D3DCCD1}">
+              <a14:hiddenFill xmlns:a14="http://schemas.microsoft.com/office/drawing/2010/main">
+                <a:solidFill>
+                  <a:schemeClr val="accent1"/>
+                </a:solidFill>
+              </a14:hiddenFill>
+            </a:ext>
+          </a:extLst>
+        </p:spPr>
+        <p:style>
+          <a:lnRef idx="2">
+            <a:schemeClr val="accent1">
+              <a:shade val="15000"/>
+            </a:schemeClr>
+          </a:lnRef>
+          <a:fillRef idx="1">
+            <a:schemeClr val="accent1"/>
+          </a:fillRef>
+          <a:effectRef idx="0">
+            <a:schemeClr val="accent1"/>
+          </a:effectRef>
+          <a:fontRef idx="minor">
+            <a:schemeClr val="lt1"/>
+          </a:fontRef>
+        </p:style>
+        <p:txBody>
+          <a:bodyPr rtlCol="0" anchor="ctr"/>
+          <a:lstStyle/>
+          <a:p>
+            <a:pPr algn="ctr"/>
+            <a:endParaRPr lang="en-IL"/>
+          </a:p>
+        </p:txBody>
+      </p:sp>
+    </p:spTree>
+    <p:custDataLst>
+      <p:tags r:id="rId1"/>
+    </p:custDataLst>
+    <p:extLst>
+      <p:ext uri="{BB962C8B-B14F-4D97-AF65-F5344CB8AC3E}">
+        <p14:creationId xmlns:p14="http://schemas.microsoft.com/office/powerpoint/2010/main" val="423746787"/>
       </p:ext>
     </p:extLst>
   </p:cSld>
@@ -7880,8 +8629,32 @@
 <file path=ppt/tags/tag1.xml><?xml version="1.0" encoding="utf-8"?>
 <p:tagLst xmlns:a="http://schemas.openxmlformats.org/drawingml/2006/main" xmlns:r="http://schemas.openxmlformats.org/officeDocument/2006/relationships" xmlns:p="http://schemas.openxmlformats.org/presentationml/2006/main">
   <p:tag name="_I2P_DUMMY_" val="true"/>
-  <p:tag name="_I2P_PATH_" val="C:\Irit2Powerpoint\Irit2Powerpoint\docs\example\ai_tea.itd"/>
-  <p:tag name="_I2P_IMPORT_SETTINGS_" val="&quot;C:\Irit2Powerpoint\Irit2Powerpoint\docs\example\ai_tea.itd&quot;"/>
+  <p:tag name="_I2P_PATH_" val="C:\Users\abdna\Downloads\irit\data\ir_tpot6.itd"/>
+  <p:tag name="_I2P_IMPORT_SETTINGS_" val="-W 0 &quot;C:\Users\abdna\Downloads\irit\data\ir_tpot6.itd&quot;"/>
+</p:tagLst>
+</file>
+
+<file path=ppt/tags/tag2.xml><?xml version="1.0" encoding="utf-8"?>
+<p:tagLst xmlns:a="http://schemas.openxmlformats.org/drawingml/2006/main" xmlns:r="http://schemas.openxmlformats.org/officeDocument/2006/relationships" xmlns:p="http://schemas.openxmlformats.org/presentationml/2006/main">
+  <p:tag name="_I2P_DUMMY_" val="true"/>
+  <p:tag name="_I2P_PATH_" val="C:\Irit2Powerpoint\Irit2Powerpoint\docs\example\f16.itd"/>
+  <p:tag name="_I2P_IMPORT_SETTINGS_" val="-S 3,2,-5,0.1,1,1 &quot;C:\Irit2Powerpoint\Irit2Powerpoint\docs\example\f16.itd&quot;"/>
+</p:tagLst>
+</file>
+
+<file path=ppt/tags/tag3.xml><?xml version="1.0" encoding="utf-8"?>
+<p:tagLst xmlns:a="http://schemas.openxmlformats.org/drawingml/2006/main" xmlns:r="http://schemas.openxmlformats.org/officeDocument/2006/relationships" xmlns:p="http://schemas.openxmlformats.org/presentationml/2006/main">
+  <p:tag name="_I2P_DUMMY_" val="true"/>
+  <p:tag name="_I2P_PATH_" val="C:\Irit2Powerpoint\Irit2Powerpoint\docs\example\fltrtest.itd"/>
+  <p:tag name="_I2P_IMPORT_SETTINGS_" val="-Z -10 10 &quot;C:\Irit2Powerpoint\Irit2Powerpoint\docs\example\fltrtest.itd&quot;"/>
+</p:tagLst>
+</file>
+
+<file path=ppt/tags/tag4.xml><?xml version="1.0" encoding="utf-8"?>
+<p:tagLst xmlns:a="http://schemas.openxmlformats.org/drawingml/2006/main" xmlns:r="http://schemas.openxmlformats.org/officeDocument/2006/relationships" xmlns:p="http://schemas.openxmlformats.org/presentationml/2006/main">
+  <p:tag name="_I2P_DUMMY_" val="true"/>
+  <p:tag name="_I2P_PATH_" val="C:\Irit2Powerpoint\Irit2Powerpoint\docs\example\duck3.itd"/>
+  <p:tag name="_I2P_IMPORT_SETTINGS_" val="&quot;C:\Irit2Powerpoint\Irit2Powerpoint\docs\example\duck3.itd&quot;"/>
 </p:tagLst>
 </file>
 
@@ -7896,34 +8669,34 @@
         <a:sysClr val="window" lastClr="FFFFFF"/>
       </a:lt1>
       <a:dk2>
-        <a:srgbClr val="9D360E"/>
+        <a:srgbClr val="1F8094"/>
       </a:dk2>
       <a:lt2>
         <a:srgbClr val="E7E6E6"/>
       </a:lt2>
       <a:accent1>
-        <a:srgbClr val="F09415"/>
+        <a:srgbClr val="39CDE7"/>
       </a:accent1>
       <a:accent2>
-        <a:srgbClr val="C1B56B"/>
+        <a:srgbClr val="60DE72"/>
       </a:accent2>
       <a:accent3>
-        <a:srgbClr val="4BAF73"/>
+        <a:srgbClr val="DDCC64"/>
       </a:accent3>
       <a:accent4>
-        <a:srgbClr val="5AA6C0"/>
+        <a:srgbClr val="F49D50"/>
       </a:accent4>
       <a:accent5>
-        <a:srgbClr val="D17DF9"/>
+        <a:srgbClr val="E44951"/>
       </a:accent5>
       <a:accent6>
-        <a:srgbClr val="FA7E5C"/>
+        <a:srgbClr val="D666F9"/>
       </a:accent6>
       <a:hlink>
-        <a:srgbClr val="FFAE3E"/>
+        <a:srgbClr val="4BF7ED"/>
       </a:hlink>
       <a:folHlink>
-        <a:srgbClr val="FCC77E"/>
+        <a:srgbClr val="95E9F4"/>
       </a:folHlink>
     </a:clrScheme>
     <a:fontScheme name="Berlin">
@@ -8102,7 +8875,7 @@
               <a:schemeClr val="phClr">
                 <a:tint val="96000"/>
                 <a:shade val="100000"/>
-                <a:hueMod val="270000"/>
+                <a:hueMod val="92000"/>
                 <a:satMod val="200000"/>
                 <a:lumMod val="128000"/>
               </a:schemeClr>
@@ -8118,8 +8891,8 @@
             <a:gs pos="100000">
               <a:schemeClr val="phClr">
                 <a:shade val="78000"/>
-                <a:hueMod val="44000"/>
-                <a:satMod val="200000"/>
+                <a:hueMod val="118000"/>
+                <a:satMod val="120000"/>
                 <a:lumMod val="69000"/>
               </a:schemeClr>
             </a:gs>
@@ -8133,7 +8906,7 @@
   <a:extraClrSchemeLst/>
   <a:extLst>
     <a:ext uri="{05A4C25C-085E-4340-85A3-A5531E510DB2}">
-      <thm15:themeFamily xmlns:thm15="http://schemas.microsoft.com/office/thememl/2012/main" name="Berlin" id="{7B5DBA9E-B069-418E-9360-A61BDD0615A4}" vid="{C0CBE056-4EF4-4D92-969E-947779DA7AAA}"/>
+      <thm15:themeFamily xmlns:thm15="http://schemas.microsoft.com/office/thememl/2012/main" name="Berlin" id="{7B5DBA9E-B069-418E-9360-A61BDD0615A4}" vid="{C7DC10E3-4FF5-456B-A359-A0F378C1E5FB}"/>
     </a:ext>
   </a:extLst>
 </a:theme>

</xml_diff>